<commit_message>
Add sponsor slide to pptx.
</commit_message>
<xml_diff>
--- a/Fixie-CodeCamp2013/Fixie-AustinCodeCamp2013.pptx
+++ b/Fixie-CodeCamp2013/Fixie-AustinCodeCamp2013.pptx
@@ -5,13 +5,14 @@
     <p:sldMasterId id="2147483648" r:id="rId1"/>
   </p:sldMasterIdLst>
   <p:notesMasterIdLst>
-    <p:notesMasterId r:id="rId6"/>
+    <p:notesMasterId r:id="rId7"/>
   </p:notesMasterIdLst>
   <p:sldIdLst>
-    <p:sldId id="256" r:id="rId2"/>
-    <p:sldId id="257" r:id="rId3"/>
-    <p:sldId id="258" r:id="rId4"/>
-    <p:sldId id="259" r:id="rId5"/>
+    <p:sldId id="260" r:id="rId2"/>
+    <p:sldId id="256" r:id="rId3"/>
+    <p:sldId id="257" r:id="rId4"/>
+    <p:sldId id="258" r:id="rId5"/>
+    <p:sldId id="259" r:id="rId6"/>
   </p:sldIdLst>
   <p:sldSz cx="9144000" cy="6858000" type="screen4x3"/>
   <p:notesSz cx="6858000" cy="9144000"/>
@@ -195,7 +196,7 @@
           <a:p>
             <a:fld id="{9D03AE1A-93C5-4C83-8F17-D9B5560A3F53}" type="datetimeFigureOut">
               <a:rPr lang="en-US" smtClean="0"/>
-              <a:t>8/15/2013</a:t>
+              <a:t>8/16/2013</a:t>
             </a:fld>
             <a:endParaRPr lang="en-US"/>
           </a:p>
@@ -645,7 +646,7 @@
             <a:fld id="{1D8BD707-D9CF-40AE-B4C6-C98DA3205C09}" type="datetimeFigureOut">
               <a:rPr lang="en-US" smtClean="0"/>
               <a:pPr/>
-              <a:t>8/15/2013</a:t>
+              <a:t>8/16/2013</a:t>
             </a:fld>
             <a:endParaRPr lang="en-US"/>
           </a:p>
@@ -812,7 +813,7 @@
             <a:fld id="{1D8BD707-D9CF-40AE-B4C6-C98DA3205C09}" type="datetimeFigureOut">
               <a:rPr lang="en-US" smtClean="0"/>
               <a:pPr/>
-              <a:t>8/15/2013</a:t>
+              <a:t>8/16/2013</a:t>
             </a:fld>
             <a:endParaRPr lang="en-US"/>
           </a:p>
@@ -989,7 +990,7 @@
             <a:fld id="{1D8BD707-D9CF-40AE-B4C6-C98DA3205C09}" type="datetimeFigureOut">
               <a:rPr lang="en-US" smtClean="0"/>
               <a:pPr/>
-              <a:t>8/15/2013</a:t>
+              <a:t>8/16/2013</a:t>
             </a:fld>
             <a:endParaRPr lang="en-US"/>
           </a:p>
@@ -1156,7 +1157,7 @@
             <a:fld id="{1D8BD707-D9CF-40AE-B4C6-C98DA3205C09}" type="datetimeFigureOut">
               <a:rPr lang="en-US" smtClean="0"/>
               <a:pPr/>
-              <a:t>8/15/2013</a:t>
+              <a:t>8/16/2013</a:t>
             </a:fld>
             <a:endParaRPr lang="en-US"/>
           </a:p>
@@ -1399,7 +1400,7 @@
             <a:fld id="{1D8BD707-D9CF-40AE-B4C6-C98DA3205C09}" type="datetimeFigureOut">
               <a:rPr lang="en-US" smtClean="0"/>
               <a:pPr/>
-              <a:t>8/15/2013</a:t>
+              <a:t>8/16/2013</a:t>
             </a:fld>
             <a:endParaRPr lang="en-US"/>
           </a:p>
@@ -1684,7 +1685,7 @@
             <a:fld id="{1D8BD707-D9CF-40AE-B4C6-C98DA3205C09}" type="datetimeFigureOut">
               <a:rPr lang="en-US" smtClean="0"/>
               <a:pPr/>
-              <a:t>8/15/2013</a:t>
+              <a:t>8/16/2013</a:t>
             </a:fld>
             <a:endParaRPr lang="en-US"/>
           </a:p>
@@ -2103,7 +2104,7 @@
             <a:fld id="{1D8BD707-D9CF-40AE-B4C6-C98DA3205C09}" type="datetimeFigureOut">
               <a:rPr lang="en-US" smtClean="0"/>
               <a:pPr/>
-              <a:t>8/15/2013</a:t>
+              <a:t>8/16/2013</a:t>
             </a:fld>
             <a:endParaRPr lang="en-US"/>
           </a:p>
@@ -2218,7 +2219,7 @@
             <a:fld id="{1D8BD707-D9CF-40AE-B4C6-C98DA3205C09}" type="datetimeFigureOut">
               <a:rPr lang="en-US" smtClean="0"/>
               <a:pPr/>
-              <a:t>8/15/2013</a:t>
+              <a:t>8/16/2013</a:t>
             </a:fld>
             <a:endParaRPr lang="en-US"/>
           </a:p>
@@ -2310,7 +2311,7 @@
             <a:fld id="{1D8BD707-D9CF-40AE-B4C6-C98DA3205C09}" type="datetimeFigureOut">
               <a:rPr lang="en-US" smtClean="0"/>
               <a:pPr/>
-              <a:t>8/15/2013</a:t>
+              <a:t>8/16/2013</a:t>
             </a:fld>
             <a:endParaRPr lang="en-US"/>
           </a:p>
@@ -2584,7 +2585,7 @@
             <a:fld id="{1D8BD707-D9CF-40AE-B4C6-C98DA3205C09}" type="datetimeFigureOut">
               <a:rPr lang="en-US" smtClean="0"/>
               <a:pPr/>
-              <a:t>8/15/2013</a:t>
+              <a:t>8/16/2013</a:t>
             </a:fld>
             <a:endParaRPr lang="en-US"/>
           </a:p>
@@ -2834,7 +2835,7 @@
             <a:fld id="{1D8BD707-D9CF-40AE-B4C6-C98DA3205C09}" type="datetimeFigureOut">
               <a:rPr lang="en-US" smtClean="0"/>
               <a:pPr/>
-              <a:t>8/15/2013</a:t>
+              <a:t>8/16/2013</a:t>
             </a:fld>
             <a:endParaRPr lang="en-US"/>
           </a:p>
@@ -3044,7 +3045,7 @@
             <a:fld id="{1D8BD707-D9CF-40AE-B4C6-C98DA3205C09}" type="datetimeFigureOut">
               <a:rPr lang="en-US" smtClean="0"/>
               <a:pPr/>
-              <a:t>8/15/2013</a:t>
+              <a:t>8/16/2013</a:t>
             </a:fld>
             <a:endParaRPr lang="en-US"/>
           </a:p>
@@ -3415,6 +3416,669 @@
           <a:chExt cx="0" cy="0"/>
         </a:xfrm>
       </p:grpSpPr>
+      <p:sp>
+        <p:nvSpPr>
+          <p:cNvPr id="4" name="Title 1"/>
+          <p:cNvSpPr txBox="1">
+            <a:spLocks/>
+          </p:cNvSpPr>
+          <p:nvPr/>
+        </p:nvSpPr>
+        <p:spPr>
+          <a:xfrm>
+            <a:off x="762000" y="152400"/>
+            <a:ext cx="7772400" cy="612775"/>
+          </a:xfrm>
+          <a:prstGeom prst="rect">
+            <a:avLst/>
+          </a:prstGeom>
+        </p:spPr>
+        <p:txBody>
+          <a:bodyPr vert="horz" lIns="91440" tIns="45720" rIns="91440" bIns="45720" rtlCol="0" anchor="ctr">
+            <a:normAutofit fontScale="90000" lnSpcReduction="20000"/>
+          </a:bodyPr>
+          <a:lstStyle>
+            <a:lvl1pPr algn="ctr" defTabSz="914400" rtl="0" eaLnBrk="1" latinLnBrk="0" hangingPunct="1">
+              <a:spcBef>
+                <a:spcPct val="0"/>
+              </a:spcBef>
+              <a:buNone/>
+              <a:defRPr sz="4400" kern="1200">
+                <a:solidFill>
+                  <a:schemeClr val="tx1"/>
+                </a:solidFill>
+                <a:latin typeface="+mj-lt"/>
+                <a:ea typeface="+mj-ea"/>
+                <a:cs typeface="+mj-cs"/>
+              </a:defRPr>
+            </a:lvl1pPr>
+          </a:lstStyle>
+          <a:p>
+            <a:r>
+              <a:rPr lang="en-US" smtClean="0"/>
+              <a:t>Code Camp 2013 Sponsors</a:t>
+            </a:r>
+            <a:endParaRPr lang="en-US" dirty="0"/>
+          </a:p>
+        </p:txBody>
+      </p:sp>
+      <p:sp>
+        <p:nvSpPr>
+          <p:cNvPr id="5" name="TextBox 4"/>
+          <p:cNvSpPr txBox="1"/>
+          <p:nvPr/>
+        </p:nvSpPr>
+        <p:spPr>
+          <a:xfrm>
+            <a:off x="76200" y="1066800"/>
+            <a:ext cx="2590800" cy="923330"/>
+          </a:xfrm>
+          <a:prstGeom prst="rect">
+            <a:avLst/>
+          </a:prstGeom>
+          <a:noFill/>
+        </p:spPr>
+        <p:txBody>
+          <a:bodyPr wrap="square" rtlCol="0">
+            <a:spAutoFit/>
+          </a:bodyPr>
+          <a:lstStyle/>
+          <a:p>
+            <a:r>
+              <a:rPr lang="en-US" sz="5400" dirty="0" smtClean="0"/>
+              <a:t>Gold</a:t>
+            </a:r>
+            <a:endParaRPr lang="en-US" sz="5400" dirty="0"/>
+          </a:p>
+        </p:txBody>
+      </p:sp>
+      <p:sp>
+        <p:nvSpPr>
+          <p:cNvPr id="6" name="TextBox 5"/>
+          <p:cNvSpPr txBox="1"/>
+          <p:nvPr/>
+        </p:nvSpPr>
+        <p:spPr>
+          <a:xfrm>
+            <a:off x="0" y="3505200"/>
+            <a:ext cx="1828800" cy="923330"/>
+          </a:xfrm>
+          <a:prstGeom prst="rect">
+            <a:avLst/>
+          </a:prstGeom>
+          <a:noFill/>
+        </p:spPr>
+        <p:txBody>
+          <a:bodyPr wrap="square" rtlCol="0">
+            <a:spAutoFit/>
+          </a:bodyPr>
+          <a:lstStyle/>
+          <a:p>
+            <a:r>
+              <a:rPr lang="en-US" sz="5400" dirty="0" smtClean="0"/>
+              <a:t>Silver</a:t>
+            </a:r>
+            <a:endParaRPr lang="en-US" sz="5400" dirty="0"/>
+          </a:p>
+        </p:txBody>
+      </p:sp>
+      <p:sp>
+        <p:nvSpPr>
+          <p:cNvPr id="7" name="TextBox 6"/>
+          <p:cNvSpPr txBox="1"/>
+          <p:nvPr/>
+        </p:nvSpPr>
+        <p:spPr>
+          <a:xfrm>
+            <a:off x="0" y="5259121"/>
+            <a:ext cx="2438400" cy="923330"/>
+          </a:xfrm>
+          <a:prstGeom prst="rect">
+            <a:avLst/>
+          </a:prstGeom>
+          <a:noFill/>
+        </p:spPr>
+        <p:txBody>
+          <a:bodyPr wrap="square" rtlCol="0">
+            <a:spAutoFit/>
+          </a:bodyPr>
+          <a:lstStyle/>
+          <a:p>
+            <a:r>
+              <a:rPr lang="en-US" sz="5400" dirty="0" smtClean="0"/>
+              <a:t>Bronze</a:t>
+            </a:r>
+          </a:p>
+        </p:txBody>
+      </p:sp>
+      <p:pic>
+        <p:nvPicPr>
+          <p:cNvPr id="8" name="Picture 3" descr="C:\Users\emcvicker\Downloads\SponsorLogos\dasp-logo-aspnet-tfs-250.png"/>
+          <p:cNvPicPr>
+            <a:picLocks noChangeAspect="1" noChangeArrowheads="1"/>
+          </p:cNvPicPr>
+          <p:nvPr/>
+        </p:nvPicPr>
+        <p:blipFill>
+          <a:blip r:embed="rId2">
+            <a:extLst>
+              <a:ext uri="{28A0092B-C50C-407E-A947-70E740481C1C}">
+                <a14:useLocalDpi xmlns:a14="http://schemas.microsoft.com/office/drawing/2010/main" val="0"/>
+              </a:ext>
+            </a:extLst>
+          </a:blip>
+          <a:srcRect/>
+          <a:stretch>
+            <a:fillRect/>
+          </a:stretch>
+        </p:blipFill>
+        <p:spPr bwMode="auto">
+          <a:xfrm>
+            <a:off x="4038600" y="5119568"/>
+            <a:ext cx="1600200" cy="832104"/>
+          </a:xfrm>
+          <a:prstGeom prst="rect">
+            <a:avLst/>
+          </a:prstGeom>
+          <a:noFill/>
+          <a:extLst>
+            <a:ext uri="{909E8E84-426E-40DD-AFC4-6F175D3DCCD1}">
+              <a14:hiddenFill xmlns:a14="http://schemas.microsoft.com/office/drawing/2010/main">
+                <a:solidFill>
+                  <a:srgbClr val="FFFFFF"/>
+                </a:solidFill>
+              </a14:hiddenFill>
+            </a:ext>
+          </a:extLst>
+        </p:spPr>
+      </p:pic>
+      <p:pic>
+        <p:nvPicPr>
+          <p:cNvPr id="9" name="Picture 4" descr="C:\Users\emcvicker\Downloads\SponsorLogos\FS Logo (Dark) - CWN tag.png"/>
+          <p:cNvPicPr>
+            <a:picLocks noChangeAspect="1" noChangeArrowheads="1"/>
+          </p:cNvPicPr>
+          <p:nvPr/>
+        </p:nvPicPr>
+        <p:blipFill>
+          <a:blip r:embed="rId3" cstate="print">
+            <a:extLst>
+              <a:ext uri="{28A0092B-C50C-407E-A947-70E740481C1C}">
+                <a14:useLocalDpi xmlns:a14="http://schemas.microsoft.com/office/drawing/2010/main" val="0"/>
+              </a:ext>
+            </a:extLst>
+          </a:blip>
+          <a:srcRect/>
+          <a:stretch>
+            <a:fillRect/>
+          </a:stretch>
+        </p:blipFill>
+        <p:spPr bwMode="auto">
+          <a:xfrm>
+            <a:off x="5938348" y="5194913"/>
+            <a:ext cx="2488661" cy="596287"/>
+          </a:xfrm>
+          <a:prstGeom prst="rect">
+            <a:avLst/>
+          </a:prstGeom>
+          <a:noFill/>
+          <a:extLst>
+            <a:ext uri="{909E8E84-426E-40DD-AFC4-6F175D3DCCD1}">
+              <a14:hiddenFill xmlns:a14="http://schemas.microsoft.com/office/drawing/2010/main">
+                <a:solidFill>
+                  <a:srgbClr val="FFFFFF"/>
+                </a:solidFill>
+              </a14:hiddenFill>
+            </a:ext>
+          </a:extLst>
+        </p:spPr>
+      </p:pic>
+      <p:pic>
+        <p:nvPicPr>
+          <p:cNvPr id="10" name="Picture 5" descr="C:\Users\emcvicker\Downloads\SponsorLogos\Logo-72.png"/>
+          <p:cNvPicPr>
+            <a:picLocks noChangeAspect="1" noChangeArrowheads="1"/>
+          </p:cNvPicPr>
+          <p:nvPr/>
+        </p:nvPicPr>
+        <p:blipFill>
+          <a:blip r:embed="rId4">
+            <a:extLst>
+              <a:ext uri="{28A0092B-C50C-407E-A947-70E740481C1C}">
+                <a14:useLocalDpi xmlns:a14="http://schemas.microsoft.com/office/drawing/2010/main" val="0"/>
+              </a:ext>
+            </a:extLst>
+          </a:blip>
+          <a:srcRect/>
+          <a:stretch>
+            <a:fillRect/>
+          </a:stretch>
+        </p:blipFill>
+        <p:spPr bwMode="auto">
+          <a:xfrm>
+            <a:off x="5830632" y="2299531"/>
+            <a:ext cx="3276600" cy="756138"/>
+          </a:xfrm>
+          <a:prstGeom prst="rect">
+            <a:avLst/>
+          </a:prstGeom>
+          <a:noFill/>
+          <a:extLst>
+            <a:ext uri="{909E8E84-426E-40DD-AFC4-6F175D3DCCD1}">
+              <a14:hiddenFill xmlns:a14="http://schemas.microsoft.com/office/drawing/2010/main">
+                <a:solidFill>
+                  <a:srgbClr val="FFFFFF"/>
+                </a:solidFill>
+              </a14:hiddenFill>
+            </a:ext>
+          </a:extLst>
+        </p:spPr>
+      </p:pic>
+      <p:pic>
+        <p:nvPicPr>
+          <p:cNvPr id="11" name="Picture 6" descr="C:\Users\emcvicker\Downloads\SponsorLogos\Neudesic%20Logo%201%20PNG%20Transparent%20Background%20Full-Color.png"/>
+          <p:cNvPicPr>
+            <a:picLocks noChangeAspect="1" noChangeArrowheads="1"/>
+          </p:cNvPicPr>
+          <p:nvPr/>
+        </p:nvPicPr>
+        <p:blipFill>
+          <a:blip r:embed="rId5" cstate="print">
+            <a:extLst>
+              <a:ext uri="{28A0092B-C50C-407E-A947-70E740481C1C}">
+                <a14:useLocalDpi xmlns:a14="http://schemas.microsoft.com/office/drawing/2010/main" val="0"/>
+              </a:ext>
+            </a:extLst>
+          </a:blip>
+          <a:srcRect/>
+          <a:stretch>
+            <a:fillRect/>
+          </a:stretch>
+        </p:blipFill>
+        <p:spPr bwMode="auto">
+          <a:xfrm>
+            <a:off x="2150922" y="5318152"/>
+            <a:ext cx="1752599" cy="664142"/>
+          </a:xfrm>
+          <a:prstGeom prst="rect">
+            <a:avLst/>
+          </a:prstGeom>
+          <a:noFill/>
+          <a:extLst>
+            <a:ext uri="{909E8E84-426E-40DD-AFC4-6F175D3DCCD1}">
+              <a14:hiddenFill xmlns:a14="http://schemas.microsoft.com/office/drawing/2010/main">
+                <a:solidFill>
+                  <a:srgbClr val="FFFFFF"/>
+                </a:solidFill>
+              </a14:hiddenFill>
+            </a:ext>
+          </a:extLst>
+        </p:spPr>
+      </p:pic>
+      <p:pic>
+        <p:nvPicPr>
+          <p:cNvPr id="12" name="Picture 7" descr="C:\Users\emcvicker\Downloads\SponsorLogos\nokia-logos.jpg"/>
+          <p:cNvPicPr>
+            <a:picLocks noChangeAspect="1" noChangeArrowheads="1"/>
+          </p:cNvPicPr>
+          <p:nvPr/>
+        </p:nvPicPr>
+        <p:blipFill>
+          <a:blip r:embed="rId6" cstate="print">
+            <a:extLst>
+              <a:ext uri="{28A0092B-C50C-407E-A947-70E740481C1C}">
+                <a14:useLocalDpi xmlns:a14="http://schemas.microsoft.com/office/drawing/2010/main" val="0"/>
+              </a:ext>
+            </a:extLst>
+          </a:blip>
+          <a:srcRect/>
+          <a:stretch>
+            <a:fillRect/>
+          </a:stretch>
+        </p:blipFill>
+        <p:spPr bwMode="auto">
+          <a:xfrm>
+            <a:off x="2971800" y="2206113"/>
+            <a:ext cx="2514600" cy="942975"/>
+          </a:xfrm>
+          <a:prstGeom prst="rect">
+            <a:avLst/>
+          </a:prstGeom>
+          <a:noFill/>
+          <a:extLst>
+            <a:ext uri="{909E8E84-426E-40DD-AFC4-6F175D3DCCD1}">
+              <a14:hiddenFill xmlns:a14="http://schemas.microsoft.com/office/drawing/2010/main">
+                <a:solidFill>
+                  <a:srgbClr val="FFFFFF"/>
+                </a:solidFill>
+              </a14:hiddenFill>
+            </a:ext>
+          </a:extLst>
+        </p:spPr>
+      </p:pic>
+      <p:sp>
+        <p:nvSpPr>
+          <p:cNvPr id="13" name="Rectangle 12"/>
+          <p:cNvSpPr/>
+          <p:nvPr/>
+        </p:nvSpPr>
+        <p:spPr>
+          <a:xfrm>
+            <a:off x="1752600" y="1008722"/>
+            <a:ext cx="2629611" cy="1059130"/>
+          </a:xfrm>
+          <a:prstGeom prst="rect">
+            <a:avLst/>
+          </a:prstGeom>
+        </p:spPr>
+        <p:style>
+          <a:lnRef idx="2">
+            <a:schemeClr val="accent1">
+              <a:shade val="50000"/>
+            </a:schemeClr>
+          </a:lnRef>
+          <a:fillRef idx="1">
+            <a:schemeClr val="accent1"/>
+          </a:fillRef>
+          <a:effectRef idx="0">
+            <a:schemeClr val="accent1"/>
+          </a:effectRef>
+          <a:fontRef idx="minor">
+            <a:schemeClr val="lt1"/>
+          </a:fontRef>
+        </p:style>
+        <p:txBody>
+          <a:bodyPr rtlCol="0" anchor="ctr"/>
+          <a:lstStyle/>
+          <a:p>
+            <a:pPr algn="ctr"/>
+            <a:endParaRPr lang="en-US"/>
+          </a:p>
+        </p:txBody>
+      </p:sp>
+      <p:pic>
+        <p:nvPicPr>
+          <p:cNvPr id="14" name="Picture 8" descr="C:\Users\emcvicker\Downloads\SponsorLogos\stedpec.png"/>
+          <p:cNvPicPr>
+            <a:picLocks noChangeAspect="1" noChangeArrowheads="1"/>
+          </p:cNvPicPr>
+          <p:nvPr/>
+        </p:nvPicPr>
+        <p:blipFill>
+          <a:blip r:embed="rId7">
+            <a:extLst>
+              <a:ext uri="{28A0092B-C50C-407E-A947-70E740481C1C}">
+                <a14:useLocalDpi xmlns:a14="http://schemas.microsoft.com/office/drawing/2010/main" val="0"/>
+              </a:ext>
+            </a:extLst>
+          </a:blip>
+          <a:srcRect/>
+          <a:stretch>
+            <a:fillRect/>
+          </a:stretch>
+        </p:blipFill>
+        <p:spPr bwMode="auto">
+          <a:xfrm>
+            <a:off x="1828800" y="894644"/>
+            <a:ext cx="2752636" cy="1237696"/>
+          </a:xfrm>
+          <a:prstGeom prst="rect">
+            <a:avLst/>
+          </a:prstGeom>
+          <a:noFill/>
+          <a:extLst>
+            <a:ext uri="{909E8E84-426E-40DD-AFC4-6F175D3DCCD1}">
+              <a14:hiddenFill xmlns:a14="http://schemas.microsoft.com/office/drawing/2010/main">
+                <a:solidFill>
+                  <a:srgbClr val="FFFFFF"/>
+                </a:solidFill>
+              </a14:hiddenFill>
+            </a:ext>
+          </a:extLst>
+        </p:spPr>
+      </p:pic>
+      <p:pic>
+        <p:nvPicPr>
+          <p:cNvPr id="15" name="Picture 10" descr="C:\Users\emcvicker\Downloads\SponsorLogos\componentone_gc_logo_vertical_black.png"/>
+          <p:cNvPicPr>
+            <a:picLocks noChangeAspect="1" noChangeArrowheads="1"/>
+          </p:cNvPicPr>
+          <p:nvPr/>
+        </p:nvPicPr>
+        <p:blipFill>
+          <a:blip r:embed="rId8" cstate="print">
+            <a:extLst>
+              <a:ext uri="{28A0092B-C50C-407E-A947-70E740481C1C}">
+                <a14:useLocalDpi xmlns:a14="http://schemas.microsoft.com/office/drawing/2010/main" val="0"/>
+              </a:ext>
+            </a:extLst>
+          </a:blip>
+          <a:srcRect/>
+          <a:stretch>
+            <a:fillRect/>
+          </a:stretch>
+        </p:blipFill>
+        <p:spPr bwMode="auto">
+          <a:xfrm>
+            <a:off x="1098180" y="2104802"/>
+            <a:ext cx="1583108" cy="1266487"/>
+          </a:xfrm>
+          <a:prstGeom prst="rect">
+            <a:avLst/>
+          </a:prstGeom>
+          <a:noFill/>
+          <a:extLst>
+            <a:ext uri="{909E8E84-426E-40DD-AFC4-6F175D3DCCD1}">
+              <a14:hiddenFill xmlns:a14="http://schemas.microsoft.com/office/drawing/2010/main">
+                <a:solidFill>
+                  <a:srgbClr val="FFFFFF"/>
+                </a:solidFill>
+              </a14:hiddenFill>
+            </a:ext>
+          </a:extLst>
+        </p:spPr>
+      </p:pic>
+      <p:pic>
+        <p:nvPicPr>
+          <p:cNvPr id="16" name="Picture 11" descr="C:\Users\emcvicker\Downloads\SponsorLogos\blizzard.jpg"/>
+          <p:cNvPicPr>
+            <a:picLocks noChangeAspect="1" noChangeArrowheads="1"/>
+          </p:cNvPicPr>
+          <p:nvPr/>
+        </p:nvPicPr>
+        <p:blipFill>
+          <a:blip r:embed="rId9">
+            <a:extLst>
+              <a:ext uri="{28A0092B-C50C-407E-A947-70E740481C1C}">
+                <a14:useLocalDpi xmlns:a14="http://schemas.microsoft.com/office/drawing/2010/main" val="0"/>
+              </a:ext>
+            </a:extLst>
+          </a:blip>
+          <a:srcRect/>
+          <a:stretch>
+            <a:fillRect/>
+          </a:stretch>
+        </p:blipFill>
+        <p:spPr bwMode="auto">
+          <a:xfrm>
+            <a:off x="2040732" y="3429000"/>
+            <a:ext cx="1281112" cy="1281112"/>
+          </a:xfrm>
+          <a:prstGeom prst="rect">
+            <a:avLst/>
+          </a:prstGeom>
+          <a:noFill/>
+          <a:extLst>
+            <a:ext uri="{909E8E84-426E-40DD-AFC4-6F175D3DCCD1}">
+              <a14:hiddenFill xmlns:a14="http://schemas.microsoft.com/office/drawing/2010/main">
+                <a:solidFill>
+                  <a:srgbClr val="FFFFFF"/>
+                </a:solidFill>
+              </a14:hiddenFill>
+            </a:ext>
+          </a:extLst>
+        </p:spPr>
+      </p:pic>
+      <p:pic>
+        <p:nvPicPr>
+          <p:cNvPr id="17" name="Picture 12" descr="C:\Users\emcvicker\Downloads\SponsorLogos\ClearMeasure white background full logo.jpg"/>
+          <p:cNvPicPr>
+            <a:picLocks noChangeAspect="1" noChangeArrowheads="1"/>
+          </p:cNvPicPr>
+          <p:nvPr/>
+        </p:nvPicPr>
+        <p:blipFill>
+          <a:blip r:embed="rId10" cstate="print">
+            <a:extLst>
+              <a:ext uri="{28A0092B-C50C-407E-A947-70E740481C1C}">
+                <a14:useLocalDpi xmlns:a14="http://schemas.microsoft.com/office/drawing/2010/main" val="0"/>
+              </a:ext>
+            </a:extLst>
+          </a:blip>
+          <a:srcRect/>
+          <a:stretch>
+            <a:fillRect/>
+          </a:stretch>
+        </p:blipFill>
+        <p:spPr bwMode="auto">
+          <a:xfrm>
+            <a:off x="2458895" y="6022124"/>
+            <a:ext cx="3185833" cy="795192"/>
+          </a:xfrm>
+          <a:prstGeom prst="rect">
+            <a:avLst/>
+          </a:prstGeom>
+          <a:noFill/>
+          <a:extLst>
+            <a:ext uri="{909E8E84-426E-40DD-AFC4-6F175D3DCCD1}">
+              <a14:hiddenFill xmlns:a14="http://schemas.microsoft.com/office/drawing/2010/main">
+                <a:solidFill>
+                  <a:srgbClr val="FFFFFF"/>
+                </a:solidFill>
+              </a14:hiddenFill>
+            </a:ext>
+          </a:extLst>
+        </p:spPr>
+      </p:pic>
+      <p:pic>
+        <p:nvPicPr>
+          <p:cNvPr id="18" name="Picture 13" descr="C:\Users\emcvicker\Downloads\SponsorLogos\telerikLogo-web-1124x449px.png"/>
+          <p:cNvPicPr>
+            <a:picLocks noChangeAspect="1" noChangeArrowheads="1"/>
+          </p:cNvPicPr>
+          <p:nvPr/>
+        </p:nvPicPr>
+        <p:blipFill>
+          <a:blip r:embed="rId11" cstate="print">
+            <a:extLst>
+              <a:ext uri="{28A0092B-C50C-407E-A947-70E740481C1C}">
+                <a14:useLocalDpi xmlns:a14="http://schemas.microsoft.com/office/drawing/2010/main" val="0"/>
+              </a:ext>
+            </a:extLst>
+          </a:blip>
+          <a:srcRect/>
+          <a:stretch>
+            <a:fillRect/>
+          </a:stretch>
+        </p:blipFill>
+        <p:spPr bwMode="auto">
+          <a:xfrm>
+            <a:off x="4602865" y="894644"/>
+            <a:ext cx="3283053" cy="1311469"/>
+          </a:xfrm>
+          <a:prstGeom prst="rect">
+            <a:avLst/>
+          </a:prstGeom>
+          <a:noFill/>
+          <a:extLst>
+            <a:ext uri="{909E8E84-426E-40DD-AFC4-6F175D3DCCD1}">
+              <a14:hiddenFill xmlns:a14="http://schemas.microsoft.com/office/drawing/2010/main">
+                <a:solidFill>
+                  <a:srgbClr val="FFFFFF"/>
+                </a:solidFill>
+              </a14:hiddenFill>
+            </a:ext>
+          </a:extLst>
+        </p:spPr>
+      </p:pic>
+      <p:pic>
+        <p:nvPicPr>
+          <p:cNvPr id="19" name="Picture 14" descr="C:\Users\emcvicker\Downloads\SponsorLogos\twilio-onscreen-logo-horizontal-grey-type-large.png"/>
+          <p:cNvPicPr>
+            <a:picLocks noChangeAspect="1" noChangeArrowheads="1"/>
+          </p:cNvPicPr>
+          <p:nvPr/>
+        </p:nvPicPr>
+        <p:blipFill>
+          <a:blip r:embed="rId12" cstate="print">
+            <a:extLst>
+              <a:ext uri="{28A0092B-C50C-407E-A947-70E740481C1C}">
+                <a14:useLocalDpi xmlns:a14="http://schemas.microsoft.com/office/drawing/2010/main" val="0"/>
+              </a:ext>
+            </a:extLst>
+          </a:blip>
+          <a:srcRect/>
+          <a:stretch>
+            <a:fillRect/>
+          </a:stretch>
+        </p:blipFill>
+        <p:spPr bwMode="auto">
+          <a:xfrm>
+            <a:off x="5938348" y="5887465"/>
+            <a:ext cx="2431991" cy="842753"/>
+          </a:xfrm>
+          <a:prstGeom prst="rect">
+            <a:avLst/>
+          </a:prstGeom>
+          <a:noFill/>
+          <a:extLst>
+            <a:ext uri="{909E8E84-426E-40DD-AFC4-6F175D3DCCD1}">
+              <a14:hiddenFill xmlns:a14="http://schemas.microsoft.com/office/drawing/2010/main">
+                <a:solidFill>
+                  <a:srgbClr val="FFFFFF"/>
+                </a:solidFill>
+              </a14:hiddenFill>
+            </a:ext>
+          </a:extLst>
+        </p:spPr>
+      </p:pic>
+    </p:spTree>
+    <p:extLst>
+      <p:ext uri="{BB962C8B-B14F-4D97-AF65-F5344CB8AC3E}">
+        <p14:creationId xmlns:p14="http://schemas.microsoft.com/office/powerpoint/2010/main" val="845518262"/>
+      </p:ext>
+    </p:extLst>
+  </p:cSld>
+  <p:clrMapOvr>
+    <a:masterClrMapping/>
+  </p:clrMapOvr>
+  <p:timing>
+    <p:tnLst>
+      <p:par>
+        <p:cTn id="1" dur="indefinite" restart="never" nodeType="tmRoot"/>
+      </p:par>
+    </p:tnLst>
+  </p:timing>
+</p:sld>
+</file>
+
+<file path=ppt/slides/slide2.xml><?xml version="1.0" encoding="utf-8"?>
+<p:sld xmlns:a="http://schemas.openxmlformats.org/drawingml/2006/main" xmlns:r="http://schemas.openxmlformats.org/officeDocument/2006/relationships" xmlns:p="http://schemas.openxmlformats.org/presentationml/2006/main">
+  <p:cSld>
+    <p:spTree>
+      <p:nvGrpSpPr>
+        <p:cNvPr id="1" name=""/>
+        <p:cNvGrpSpPr/>
+        <p:nvPr/>
+      </p:nvGrpSpPr>
+      <p:grpSpPr>
+        <a:xfrm>
+          <a:off x="0" y="0"/>
+          <a:ext cx="0" cy="0"/>
+          <a:chOff x="0" y="0"/>
+          <a:chExt cx="0" cy="0"/>
+        </a:xfrm>
+      </p:grpSpPr>
       <p:pic>
         <p:nvPicPr>
           <p:cNvPr id="5" name="Picture 4"/>
@@ -3455,10 +4119,17 @@
   <p:clrMapOvr>
     <a:masterClrMapping/>
   </p:clrMapOvr>
+  <p:timing>
+    <p:tnLst>
+      <p:par>
+        <p:cTn id="1" dur="indefinite" restart="never" nodeType="tmRoot"/>
+      </p:par>
+    </p:tnLst>
+  </p:timing>
 </p:sld>
 </file>
 
-<file path=ppt/slides/slide2.xml><?xml version="1.0" encoding="utf-8"?>
+<file path=ppt/slides/slide3.xml><?xml version="1.0" encoding="utf-8"?>
 <p:sld xmlns:a="http://schemas.openxmlformats.org/drawingml/2006/main" xmlns:r="http://schemas.openxmlformats.org/officeDocument/2006/relationships" xmlns:p="http://schemas.openxmlformats.org/presentationml/2006/main">
   <p:cSld>
     <p:spTree>
@@ -3515,10 +4186,17 @@
   <p:clrMapOvr>
     <a:masterClrMapping/>
   </p:clrMapOvr>
+  <p:timing>
+    <p:tnLst>
+      <p:par>
+        <p:cTn id="1" dur="indefinite" restart="never" nodeType="tmRoot"/>
+      </p:par>
+    </p:tnLst>
+  </p:timing>
 </p:sld>
 </file>
 
-<file path=ppt/slides/slide3.xml><?xml version="1.0" encoding="utf-8"?>
+<file path=ppt/slides/slide4.xml><?xml version="1.0" encoding="utf-8"?>
 <p:sld xmlns:a="http://schemas.openxmlformats.org/drawingml/2006/main" xmlns:r="http://schemas.openxmlformats.org/officeDocument/2006/relationships" xmlns:p="http://schemas.openxmlformats.org/presentationml/2006/main">
   <p:cSld>
     <p:spTree>
@@ -3605,10 +4283,17 @@
   <p:clrMapOvr>
     <a:masterClrMapping/>
   </p:clrMapOvr>
+  <p:timing>
+    <p:tnLst>
+      <p:par>
+        <p:cTn id="1" dur="indefinite" restart="never" nodeType="tmRoot"/>
+      </p:par>
+    </p:tnLst>
+  </p:timing>
 </p:sld>
 </file>
 
-<file path=ppt/slides/slide4.xml><?xml version="1.0" encoding="utf-8"?>
+<file path=ppt/slides/slide5.xml><?xml version="1.0" encoding="utf-8"?>
 <p:sld xmlns:a="http://schemas.openxmlformats.org/drawingml/2006/main" xmlns:r="http://schemas.openxmlformats.org/officeDocument/2006/relationships" xmlns:p="http://schemas.openxmlformats.org/presentationml/2006/main">
   <p:cSld>
     <p:spTree>
@@ -3736,6 +4421,13 @@
   <p:clrMapOvr>
     <a:masterClrMapping/>
   </p:clrMapOvr>
+  <p:timing>
+    <p:tnLst>
+      <p:par>
+        <p:cTn id="1" dur="indefinite" restart="never" nodeType="tmRoot"/>
+      </p:par>
+    </p:tnLst>
+  </p:timing>
 </p:sld>
 </file>
 

</xml_diff>